<commit_message>
Mudança Mínima nos Slides
</commit_message>
<xml_diff>
--- a/T.I/PPT/Aoresentação INAD.pptx
+++ b/T.I/PPT/Aoresentação INAD.pptx
@@ -26,38 +26,38 @@
   <p:notesSz cx="6858000" cy="9144000"/>
   <p:embeddedFontLst>
     <p:embeddedFont>
+      <p:font typeface="Calibri" panose="020F0502020204030204" pitchFamily="34" charset="0"/>
+      <p:regular r:id="rId18"/>
+      <p:bold r:id="rId19"/>
+      <p:italic r:id="rId20"/>
+      <p:boldItalic r:id="rId21"/>
+    </p:embeddedFont>
+    <p:embeddedFont>
+      <p:font typeface="Montserrat Classic Bold" panose="020B0604020202020204" charset="0"/>
+      <p:regular r:id="rId22"/>
+    </p:embeddedFont>
+    <p:embeddedFont>
+      <p:font typeface="Metal Lord" panose="04010000000000000000" pitchFamily="82" charset="0"/>
+      <p:regular r:id="rId23"/>
+    </p:embeddedFont>
+    <p:embeddedFont>
       <p:font typeface="Open Sans Extra Bold" panose="020B0604020202020204" charset="0"/>
-      <p:regular r:id="rId18"/>
+      <p:regular r:id="rId24"/>
+    </p:embeddedFont>
+    <p:embeddedFont>
+      <p:font typeface="Death to Metal" pitchFamily="2" charset="0"/>
+      <p:regular r:id="rId25"/>
     </p:embeddedFont>
     <p:embeddedFont>
       <p:font typeface="MetalShred" panose="02000500000000000000" pitchFamily="2" charset="0"/>
-      <p:regular r:id="rId19"/>
-    </p:embeddedFont>
-    <p:embeddedFont>
-      <p:font typeface="Calibri" panose="020F0502020204030204" pitchFamily="34" charset="0"/>
-      <p:regular r:id="rId20"/>
-      <p:bold r:id="rId21"/>
-      <p:italic r:id="rId22"/>
-      <p:boldItalic r:id="rId23"/>
-    </p:embeddedFont>
-    <p:embeddedFont>
-      <p:font typeface="Death to Metal" pitchFamily="2" charset="0"/>
-      <p:regular r:id="rId24"/>
+      <p:regular r:id="rId26"/>
     </p:embeddedFont>
     <p:embeddedFont>
       <p:font typeface="Montserrat Classic" panose="020B0604020202020204" charset="0"/>
-      <p:regular r:id="rId25"/>
+      <p:regular r:id="rId27"/>
     </p:embeddedFont>
     <p:embeddedFont>
       <p:font typeface="Montserrat Light" panose="020B0604020202020204" charset="0"/>
-      <p:regular r:id="rId26"/>
-    </p:embeddedFont>
-    <p:embeddedFont>
-      <p:font typeface="Metal Lord" panose="04010000000000000000" pitchFamily="82" charset="0"/>
-      <p:regular r:id="rId27"/>
-    </p:embeddedFont>
-    <p:embeddedFont>
-      <p:font typeface="Montserrat Classic Bold" panose="020B0604020202020204" charset="0"/>
       <p:regular r:id="rId28"/>
     </p:embeddedFont>
   </p:embeddedFontLst>
@@ -357,7 +357,7 @@
             <a:fld id="{1D8BD707-D9CF-40AE-B4C6-C98DA3205C09}" type="datetimeFigureOut">
               <a:rPr lang="en-US" smtClean="0"/>
               <a:pPr/>
-              <a:t>6/2/2021</a:t>
+              <a:t>6/6/2021</a:t>
             </a:fld>
             <a:endParaRPr lang="en-US"/>
           </a:p>
@@ -524,7 +524,7 @@
             <a:fld id="{1D8BD707-D9CF-40AE-B4C6-C98DA3205C09}" type="datetimeFigureOut">
               <a:rPr lang="en-US" smtClean="0"/>
               <a:pPr/>
-              <a:t>6/2/2021</a:t>
+              <a:t>6/6/2021</a:t>
             </a:fld>
             <a:endParaRPr lang="en-US"/>
           </a:p>
@@ -701,7 +701,7 @@
             <a:fld id="{1D8BD707-D9CF-40AE-B4C6-C98DA3205C09}" type="datetimeFigureOut">
               <a:rPr lang="en-US" smtClean="0"/>
               <a:pPr/>
-              <a:t>6/2/2021</a:t>
+              <a:t>6/6/2021</a:t>
             </a:fld>
             <a:endParaRPr lang="en-US"/>
           </a:p>
@@ -868,7 +868,7 @@
             <a:fld id="{1D8BD707-D9CF-40AE-B4C6-C98DA3205C09}" type="datetimeFigureOut">
               <a:rPr lang="en-US" smtClean="0"/>
               <a:pPr/>
-              <a:t>6/2/2021</a:t>
+              <a:t>6/6/2021</a:t>
             </a:fld>
             <a:endParaRPr lang="en-US"/>
           </a:p>
@@ -1111,7 +1111,7 @@
             <a:fld id="{1D8BD707-D9CF-40AE-B4C6-C98DA3205C09}" type="datetimeFigureOut">
               <a:rPr lang="en-US" smtClean="0"/>
               <a:pPr/>
-              <a:t>6/2/2021</a:t>
+              <a:t>6/6/2021</a:t>
             </a:fld>
             <a:endParaRPr lang="en-US"/>
           </a:p>
@@ -1396,7 +1396,7 @@
             <a:fld id="{1D8BD707-D9CF-40AE-B4C6-C98DA3205C09}" type="datetimeFigureOut">
               <a:rPr lang="en-US" smtClean="0"/>
               <a:pPr/>
-              <a:t>6/2/2021</a:t>
+              <a:t>6/6/2021</a:t>
             </a:fld>
             <a:endParaRPr lang="en-US"/>
           </a:p>
@@ -1815,7 +1815,7 @@
             <a:fld id="{1D8BD707-D9CF-40AE-B4C6-C98DA3205C09}" type="datetimeFigureOut">
               <a:rPr lang="en-US" smtClean="0"/>
               <a:pPr/>
-              <a:t>6/2/2021</a:t>
+              <a:t>6/6/2021</a:t>
             </a:fld>
             <a:endParaRPr lang="en-US"/>
           </a:p>
@@ -1930,7 +1930,7 @@
             <a:fld id="{1D8BD707-D9CF-40AE-B4C6-C98DA3205C09}" type="datetimeFigureOut">
               <a:rPr lang="en-US" smtClean="0"/>
               <a:pPr/>
-              <a:t>6/2/2021</a:t>
+              <a:t>6/6/2021</a:t>
             </a:fld>
             <a:endParaRPr lang="en-US"/>
           </a:p>
@@ -2022,7 +2022,7 @@
             <a:fld id="{1D8BD707-D9CF-40AE-B4C6-C98DA3205C09}" type="datetimeFigureOut">
               <a:rPr lang="en-US" smtClean="0"/>
               <a:pPr/>
-              <a:t>6/2/2021</a:t>
+              <a:t>6/6/2021</a:t>
             </a:fld>
             <a:endParaRPr lang="en-US"/>
           </a:p>
@@ -2296,7 +2296,7 @@
             <a:fld id="{1D8BD707-D9CF-40AE-B4C6-C98DA3205C09}" type="datetimeFigureOut">
               <a:rPr lang="en-US" smtClean="0"/>
               <a:pPr/>
-              <a:t>6/2/2021</a:t>
+              <a:t>6/6/2021</a:t>
             </a:fld>
             <a:endParaRPr lang="en-US"/>
           </a:p>
@@ -2546,7 +2546,7 @@
             <a:fld id="{1D8BD707-D9CF-40AE-B4C6-C98DA3205C09}" type="datetimeFigureOut">
               <a:rPr lang="en-US" smtClean="0"/>
               <a:pPr/>
-              <a:t>6/2/2021</a:t>
+              <a:t>6/6/2021</a:t>
             </a:fld>
             <a:endParaRPr lang="en-US"/>
           </a:p>
@@ -2756,7 +2756,7 @@
             <a:fld id="{1D8BD707-D9CF-40AE-B4C6-C98DA3205C09}" type="datetimeFigureOut">
               <a:rPr lang="en-US" smtClean="0"/>
               <a:pPr/>
-              <a:t>6/2/2021</a:t>
+              <a:t>6/6/2021</a:t>
             </a:fld>
             <a:endParaRPr lang="en-US"/>
           </a:p>
@@ -3354,7 +3354,7 @@
                 <a14:useLocalDpi xmlns:a14="http://schemas.microsoft.com/office/drawing/2010/main" val="0"/>
               </a:ext>
               <a:ext uri="{96DAC541-7B7A-43D3-8B79-37D633B846F1}">
-                <asvg:svgBlip xmlns="" xmlns:asvg="http://schemas.microsoft.com/office/drawing/2016/SVG/main" r:embed="rId3"/>
+                <asvg:svgBlip xmlns:asvg="http://schemas.microsoft.com/office/drawing/2016/SVG/main" xmlns="" r:embed="rId3"/>
               </a:ext>
             </a:extLst>
           </a:blip>
@@ -3402,7 +3402,7 @@
                   <a14:useLocalDpi xmlns:a14="http://schemas.microsoft.com/office/drawing/2010/main" val="0"/>
                 </a:ext>
                 <a:ext uri="{96DAC541-7B7A-43D3-8B79-37D633B846F1}">
-                  <asvg:svgBlip xmlns="" xmlns:asvg="http://schemas.microsoft.com/office/drawing/2016/SVG/main" r:embed="rId5"/>
+                  <asvg:svgBlip xmlns:asvg="http://schemas.microsoft.com/office/drawing/2016/SVG/main" xmlns="" r:embed="rId5"/>
                 </a:ext>
               </a:extLst>
             </a:blip>
@@ -3436,7 +3436,7 @@
                   <a14:useLocalDpi xmlns:a14="http://schemas.microsoft.com/office/drawing/2010/main" val="0"/>
                 </a:ext>
                 <a:ext uri="{96DAC541-7B7A-43D3-8B79-37D633B846F1}">
-                  <asvg:svgBlip xmlns="" xmlns:asvg="http://schemas.microsoft.com/office/drawing/2016/SVG/main" r:embed="rId5"/>
+                  <asvg:svgBlip xmlns:asvg="http://schemas.microsoft.com/office/drawing/2016/SVG/main" xmlns="" r:embed="rId5"/>
                 </a:ext>
               </a:extLst>
             </a:blip>
@@ -3470,7 +3470,7 @@
                   <a14:useLocalDpi xmlns:a14="http://schemas.microsoft.com/office/drawing/2010/main" val="0"/>
                 </a:ext>
                 <a:ext uri="{96DAC541-7B7A-43D3-8B79-37D633B846F1}">
-                  <asvg:svgBlip xmlns="" xmlns:asvg="http://schemas.microsoft.com/office/drawing/2016/SVG/main" r:embed="rId5"/>
+                  <asvg:svgBlip xmlns:asvg="http://schemas.microsoft.com/office/drawing/2016/SVG/main" xmlns="" r:embed="rId5"/>
                 </a:ext>
               </a:extLst>
             </a:blip>
@@ -3533,6 +3533,13 @@
   <p:clrMapOvr>
     <a:masterClrMapping/>
   </p:clrMapOvr>
+  <p:timing>
+    <p:tnLst>
+      <p:par>
+        <p:cTn id="1" dur="indefinite" restart="never" nodeType="tmRoot"/>
+      </p:par>
+    </p:tnLst>
+  </p:timing>
 </p:sld>
 </file>
 
@@ -3714,6 +3721,13 @@
   <p:clrMapOvr>
     <a:masterClrMapping/>
   </p:clrMapOvr>
+  <p:timing>
+    <p:tnLst>
+      <p:par>
+        <p:cTn id="1" dur="indefinite" restart="never" nodeType="tmRoot"/>
+      </p:par>
+    </p:tnLst>
+  </p:timing>
 </p:sld>
 </file>
 
@@ -3905,6 +3919,13 @@
   <p:clrMapOvr>
     <a:masterClrMapping/>
   </p:clrMapOvr>
+  <p:timing>
+    <p:tnLst>
+      <p:par>
+        <p:cTn id="1" dur="indefinite" restart="never" nodeType="tmRoot"/>
+      </p:par>
+    </p:tnLst>
+  </p:timing>
 </p:sld>
 </file>
 
@@ -4151,6 +4172,13 @@
   <p:clrMapOvr>
     <a:masterClrMapping/>
   </p:clrMapOvr>
+  <p:timing>
+    <p:tnLst>
+      <p:par>
+        <p:cTn id="1" dur="indefinite" restart="never" nodeType="tmRoot"/>
+      </p:par>
+    </p:tnLst>
+  </p:timing>
 </p:sld>
 </file>
 
@@ -4395,7 +4423,7 @@
                 <a14:useLocalDpi xmlns:a14="http://schemas.microsoft.com/office/drawing/2010/main" val="0"/>
               </a:ext>
               <a:ext uri="{96DAC541-7B7A-43D3-8B79-37D633B846F1}">
-                <asvg:svgBlip xmlns="" xmlns:asvg="http://schemas.microsoft.com/office/drawing/2016/SVG/main" r:embed="rId3"/>
+                <asvg:svgBlip xmlns:asvg="http://schemas.microsoft.com/office/drawing/2016/SVG/main" xmlns="" r:embed="rId3"/>
               </a:ext>
             </a:extLst>
           </a:blip>
@@ -4462,7 +4490,7 @@
                   <a14:useLocalDpi xmlns:a14="http://schemas.microsoft.com/office/drawing/2010/main" val="0"/>
                 </a:ext>
                 <a:ext uri="{96DAC541-7B7A-43D3-8B79-37D633B846F1}">
-                  <asvg:svgBlip xmlns="" xmlns:asvg="http://schemas.microsoft.com/office/drawing/2016/SVG/main" r:embed="rId5"/>
+                  <asvg:svgBlip xmlns:asvg="http://schemas.microsoft.com/office/drawing/2016/SVG/main" xmlns="" r:embed="rId5"/>
                 </a:ext>
               </a:extLst>
             </a:blip>
@@ -4496,7 +4524,7 @@
                   <a14:useLocalDpi xmlns:a14="http://schemas.microsoft.com/office/drawing/2010/main" val="0"/>
                 </a:ext>
                 <a:ext uri="{96DAC541-7B7A-43D3-8B79-37D633B846F1}">
-                  <asvg:svgBlip xmlns="" xmlns:asvg="http://schemas.microsoft.com/office/drawing/2016/SVG/main" r:embed="rId5"/>
+                  <asvg:svgBlip xmlns:asvg="http://schemas.microsoft.com/office/drawing/2016/SVG/main" xmlns="" r:embed="rId5"/>
                 </a:ext>
               </a:extLst>
             </a:blip>
@@ -4530,7 +4558,7 @@
                   <a14:useLocalDpi xmlns:a14="http://schemas.microsoft.com/office/drawing/2010/main" val="0"/>
                 </a:ext>
                 <a:ext uri="{96DAC541-7B7A-43D3-8B79-37D633B846F1}">
-                  <asvg:svgBlip xmlns="" xmlns:asvg="http://schemas.microsoft.com/office/drawing/2016/SVG/main" r:embed="rId5"/>
+                  <asvg:svgBlip xmlns:asvg="http://schemas.microsoft.com/office/drawing/2016/SVG/main" xmlns="" r:embed="rId5"/>
                 </a:ext>
               </a:extLst>
             </a:blip>
@@ -4580,6 +4608,13 @@
   <p:clrMapOvr>
     <a:masterClrMapping/>
   </p:clrMapOvr>
+  <p:timing>
+    <p:tnLst>
+      <p:par>
+        <p:cTn id="1" dur="indefinite" restart="never" nodeType="tmRoot"/>
+      </p:par>
+    </p:tnLst>
+  </p:timing>
 </p:sld>
 </file>
 
@@ -4681,6 +4716,13 @@
   <p:clrMapOvr>
     <a:masterClrMapping/>
   </p:clrMapOvr>
+  <p:timing>
+    <p:tnLst>
+      <p:par>
+        <p:cTn id="1" dur="indefinite" restart="never" nodeType="tmRoot"/>
+      </p:par>
+    </p:tnLst>
+  </p:timing>
 </p:sld>
 </file>
 
@@ -4795,7 +4837,7 @@
                   <a14:useLocalDpi xmlns:a14="http://schemas.microsoft.com/office/drawing/2010/main" val="0"/>
                 </a:ext>
                 <a:ext uri="{96DAC541-7B7A-43D3-8B79-37D633B846F1}">
-                  <asvg:svgBlip xmlns="" xmlns:asvg="http://schemas.microsoft.com/office/drawing/2016/SVG/main" r:embed="rId3"/>
+                  <asvg:svgBlip xmlns:asvg="http://schemas.microsoft.com/office/drawing/2016/SVG/main" xmlns="" r:embed="rId3"/>
                 </a:ext>
               </a:extLst>
             </a:blip>
@@ -4829,7 +4871,7 @@
                   <a14:useLocalDpi xmlns:a14="http://schemas.microsoft.com/office/drawing/2010/main" val="0"/>
                 </a:ext>
                 <a:ext uri="{96DAC541-7B7A-43D3-8B79-37D633B846F1}">
-                  <asvg:svgBlip xmlns="" xmlns:asvg="http://schemas.microsoft.com/office/drawing/2016/SVG/main" r:embed="rId3"/>
+                  <asvg:svgBlip xmlns:asvg="http://schemas.microsoft.com/office/drawing/2016/SVG/main" xmlns="" r:embed="rId3"/>
                 </a:ext>
               </a:extLst>
             </a:blip>
@@ -4863,7 +4905,7 @@
                   <a14:useLocalDpi xmlns:a14="http://schemas.microsoft.com/office/drawing/2010/main" val="0"/>
                 </a:ext>
                 <a:ext uri="{96DAC541-7B7A-43D3-8B79-37D633B846F1}">
-                  <asvg:svgBlip xmlns="" xmlns:asvg="http://schemas.microsoft.com/office/drawing/2016/SVG/main" r:embed="rId3"/>
+                  <asvg:svgBlip xmlns:asvg="http://schemas.microsoft.com/office/drawing/2016/SVG/main" xmlns="" r:embed="rId3"/>
                 </a:ext>
               </a:extLst>
             </a:blip>
@@ -5004,6 +5046,13 @@
   <p:clrMapOvr>
     <a:masterClrMapping/>
   </p:clrMapOvr>
+  <p:timing>
+    <p:tnLst>
+      <p:par>
+        <p:cTn id="1" dur="indefinite" restart="never" nodeType="tmRoot"/>
+      </p:par>
+    </p:tnLst>
+  </p:timing>
 </p:sld>
 </file>
 
@@ -5066,7 +5115,7 @@
                 <a14:useLocalDpi xmlns:a14="http://schemas.microsoft.com/office/drawing/2010/main" val="0"/>
               </a:ext>
               <a:ext uri="{96DAC541-7B7A-43D3-8B79-37D633B846F1}">
-                <asvg:svgBlip xmlns="" xmlns:asvg="http://schemas.microsoft.com/office/drawing/2016/SVG/main" r:embed="rId3"/>
+                <asvg:svgBlip xmlns:asvg="http://schemas.microsoft.com/office/drawing/2016/SVG/main" xmlns="" r:embed="rId3"/>
               </a:ext>
             </a:extLst>
           </a:blip>
@@ -5224,7 +5273,7 @@
                   <a14:useLocalDpi xmlns:a14="http://schemas.microsoft.com/office/drawing/2010/main" val="0"/>
                 </a:ext>
                 <a:ext uri="{96DAC541-7B7A-43D3-8B79-37D633B846F1}">
-                  <asvg:svgBlip xmlns="" xmlns:asvg="http://schemas.microsoft.com/office/drawing/2016/SVG/main" r:embed="rId5"/>
+                  <asvg:svgBlip xmlns:asvg="http://schemas.microsoft.com/office/drawing/2016/SVG/main" xmlns="" r:embed="rId5"/>
                 </a:ext>
               </a:extLst>
             </a:blip>
@@ -5258,7 +5307,7 @@
                   <a14:useLocalDpi xmlns:a14="http://schemas.microsoft.com/office/drawing/2010/main" val="0"/>
                 </a:ext>
                 <a:ext uri="{96DAC541-7B7A-43D3-8B79-37D633B846F1}">
-                  <asvg:svgBlip xmlns="" xmlns:asvg="http://schemas.microsoft.com/office/drawing/2016/SVG/main" r:embed="rId5"/>
+                  <asvg:svgBlip xmlns:asvg="http://schemas.microsoft.com/office/drawing/2016/SVG/main" xmlns="" r:embed="rId5"/>
                 </a:ext>
               </a:extLst>
             </a:blip>
@@ -5292,7 +5341,7 @@
                   <a14:useLocalDpi xmlns:a14="http://schemas.microsoft.com/office/drawing/2010/main" val="0"/>
                 </a:ext>
                 <a:ext uri="{96DAC541-7B7A-43D3-8B79-37D633B846F1}">
-                  <asvg:svgBlip xmlns="" xmlns:asvg="http://schemas.microsoft.com/office/drawing/2016/SVG/main" r:embed="rId5"/>
+                  <asvg:svgBlip xmlns:asvg="http://schemas.microsoft.com/office/drawing/2016/SVG/main" xmlns="" r:embed="rId5"/>
                 </a:ext>
               </a:extLst>
             </a:blip>
@@ -5317,6 +5366,13 @@
   <p:clrMapOvr>
     <a:masterClrMapping/>
   </p:clrMapOvr>
+  <p:timing>
+    <p:tnLst>
+      <p:par>
+        <p:cTn id="1" dur="indefinite" restart="never" nodeType="tmRoot"/>
+      </p:par>
+    </p:tnLst>
+  </p:timing>
 </p:sld>
 </file>
 
@@ -5398,7 +5454,7 @@
                 <a14:useLocalDpi xmlns:a14="http://schemas.microsoft.com/office/drawing/2010/main" val="0"/>
               </a:ext>
               <a:ext uri="{96DAC541-7B7A-43D3-8B79-37D633B846F1}">
-                <asvg:svgBlip xmlns="" xmlns:asvg="http://schemas.microsoft.com/office/drawing/2016/SVG/main" r:embed="rId3"/>
+                <asvg:svgBlip xmlns:asvg="http://schemas.microsoft.com/office/drawing/2016/SVG/main" xmlns="" r:embed="rId3"/>
               </a:ext>
             </a:extLst>
           </a:blip>
@@ -5446,7 +5502,7 @@
                   <a14:useLocalDpi xmlns:a14="http://schemas.microsoft.com/office/drawing/2010/main" val="0"/>
                 </a:ext>
                 <a:ext uri="{96DAC541-7B7A-43D3-8B79-37D633B846F1}">
-                  <asvg:svgBlip xmlns="" xmlns:asvg="http://schemas.microsoft.com/office/drawing/2016/SVG/main" r:embed="rId5"/>
+                  <asvg:svgBlip xmlns:asvg="http://schemas.microsoft.com/office/drawing/2016/SVG/main" xmlns="" r:embed="rId5"/>
                 </a:ext>
               </a:extLst>
             </a:blip>
@@ -5480,7 +5536,7 @@
                   <a14:useLocalDpi xmlns:a14="http://schemas.microsoft.com/office/drawing/2010/main" val="0"/>
                 </a:ext>
                 <a:ext uri="{96DAC541-7B7A-43D3-8B79-37D633B846F1}">
-                  <asvg:svgBlip xmlns="" xmlns:asvg="http://schemas.microsoft.com/office/drawing/2016/SVG/main" r:embed="rId5"/>
+                  <asvg:svgBlip xmlns:asvg="http://schemas.microsoft.com/office/drawing/2016/SVG/main" xmlns="" r:embed="rId5"/>
                 </a:ext>
               </a:extLst>
             </a:blip>
@@ -5514,7 +5570,7 @@
                   <a14:useLocalDpi xmlns:a14="http://schemas.microsoft.com/office/drawing/2010/main" val="0"/>
                 </a:ext>
                 <a:ext uri="{96DAC541-7B7A-43D3-8B79-37D633B846F1}">
-                  <asvg:svgBlip xmlns="" xmlns:asvg="http://schemas.microsoft.com/office/drawing/2016/SVG/main" r:embed="rId5"/>
+                  <asvg:svgBlip xmlns:asvg="http://schemas.microsoft.com/office/drawing/2016/SVG/main" xmlns="" r:embed="rId5"/>
                 </a:ext>
               </a:extLst>
             </a:blip>
@@ -5653,6 +5709,13 @@
   <p:clrMapOvr>
     <a:masterClrMapping/>
   </p:clrMapOvr>
+  <p:timing>
+    <p:tnLst>
+      <p:par>
+        <p:cTn id="1" dur="indefinite" restart="never" nodeType="tmRoot"/>
+      </p:par>
+    </p:tnLst>
+  </p:timing>
 </p:sld>
 </file>
 
@@ -5734,7 +5797,7 @@
                 <a14:useLocalDpi xmlns:a14="http://schemas.microsoft.com/office/drawing/2010/main" val="0"/>
               </a:ext>
               <a:ext uri="{96DAC541-7B7A-43D3-8B79-37D633B846F1}">
-                <asvg:svgBlip xmlns="" xmlns:asvg="http://schemas.microsoft.com/office/drawing/2016/SVG/main" r:embed="rId3"/>
+                <asvg:svgBlip xmlns:asvg="http://schemas.microsoft.com/office/drawing/2016/SVG/main" xmlns="" r:embed="rId3"/>
               </a:ext>
             </a:extLst>
           </a:blip>
@@ -5782,7 +5845,7 @@
                   <a14:useLocalDpi xmlns:a14="http://schemas.microsoft.com/office/drawing/2010/main" val="0"/>
                 </a:ext>
                 <a:ext uri="{96DAC541-7B7A-43D3-8B79-37D633B846F1}">
-                  <asvg:svgBlip xmlns="" xmlns:asvg="http://schemas.microsoft.com/office/drawing/2016/SVG/main" r:embed="rId5"/>
+                  <asvg:svgBlip xmlns:asvg="http://schemas.microsoft.com/office/drawing/2016/SVG/main" xmlns="" r:embed="rId5"/>
                 </a:ext>
               </a:extLst>
             </a:blip>
@@ -5816,7 +5879,7 @@
                   <a14:useLocalDpi xmlns:a14="http://schemas.microsoft.com/office/drawing/2010/main" val="0"/>
                 </a:ext>
                 <a:ext uri="{96DAC541-7B7A-43D3-8B79-37D633B846F1}">
-                  <asvg:svgBlip xmlns="" xmlns:asvg="http://schemas.microsoft.com/office/drawing/2016/SVG/main" r:embed="rId5"/>
+                  <asvg:svgBlip xmlns:asvg="http://schemas.microsoft.com/office/drawing/2016/SVG/main" xmlns="" r:embed="rId5"/>
                 </a:ext>
               </a:extLst>
             </a:blip>
@@ -5850,7 +5913,7 @@
                   <a14:useLocalDpi xmlns:a14="http://schemas.microsoft.com/office/drawing/2010/main" val="0"/>
                 </a:ext>
                 <a:ext uri="{96DAC541-7B7A-43D3-8B79-37D633B846F1}">
-                  <asvg:svgBlip xmlns="" xmlns:asvg="http://schemas.microsoft.com/office/drawing/2016/SVG/main" r:embed="rId5"/>
+                  <asvg:svgBlip xmlns:asvg="http://schemas.microsoft.com/office/drawing/2016/SVG/main" xmlns="" r:embed="rId5"/>
                 </a:ext>
               </a:extLst>
             </a:blip>
@@ -5989,6 +6052,13 @@
   <p:clrMapOvr>
     <a:masterClrMapping/>
   </p:clrMapOvr>
+  <p:timing>
+    <p:tnLst>
+      <p:par>
+        <p:cTn id="1" dur="indefinite" restart="never" nodeType="tmRoot"/>
+      </p:par>
+    </p:tnLst>
+  </p:timing>
 </p:sld>
 </file>
 
@@ -6070,7 +6140,7 @@
                 <a14:useLocalDpi xmlns:a14="http://schemas.microsoft.com/office/drawing/2010/main" val="0"/>
               </a:ext>
               <a:ext uri="{96DAC541-7B7A-43D3-8B79-37D633B846F1}">
-                <asvg:svgBlip xmlns="" xmlns:asvg="http://schemas.microsoft.com/office/drawing/2016/SVG/main" r:embed="rId3"/>
+                <asvg:svgBlip xmlns:asvg="http://schemas.microsoft.com/office/drawing/2016/SVG/main" xmlns="" r:embed="rId3"/>
               </a:ext>
             </a:extLst>
           </a:blip>
@@ -6118,7 +6188,7 @@
                   <a14:useLocalDpi xmlns:a14="http://schemas.microsoft.com/office/drawing/2010/main" val="0"/>
                 </a:ext>
                 <a:ext uri="{96DAC541-7B7A-43D3-8B79-37D633B846F1}">
-                  <asvg:svgBlip xmlns="" xmlns:asvg="http://schemas.microsoft.com/office/drawing/2016/SVG/main" r:embed="rId5"/>
+                  <asvg:svgBlip xmlns:asvg="http://schemas.microsoft.com/office/drawing/2016/SVG/main" xmlns="" r:embed="rId5"/>
                 </a:ext>
               </a:extLst>
             </a:blip>
@@ -6152,7 +6222,7 @@
                   <a14:useLocalDpi xmlns:a14="http://schemas.microsoft.com/office/drawing/2010/main" val="0"/>
                 </a:ext>
                 <a:ext uri="{96DAC541-7B7A-43D3-8B79-37D633B846F1}">
-                  <asvg:svgBlip xmlns="" xmlns:asvg="http://schemas.microsoft.com/office/drawing/2016/SVG/main" r:embed="rId5"/>
+                  <asvg:svgBlip xmlns:asvg="http://schemas.microsoft.com/office/drawing/2016/SVG/main" xmlns="" r:embed="rId5"/>
                 </a:ext>
               </a:extLst>
             </a:blip>
@@ -6186,7 +6256,7 @@
                   <a14:useLocalDpi xmlns:a14="http://schemas.microsoft.com/office/drawing/2010/main" val="0"/>
                 </a:ext>
                 <a:ext uri="{96DAC541-7B7A-43D3-8B79-37D633B846F1}">
-                  <asvg:svgBlip xmlns="" xmlns:asvg="http://schemas.microsoft.com/office/drawing/2016/SVG/main" r:embed="rId5"/>
+                  <asvg:svgBlip xmlns:asvg="http://schemas.microsoft.com/office/drawing/2016/SVG/main" xmlns="" r:embed="rId5"/>
                 </a:ext>
               </a:extLst>
             </a:blip>
@@ -6399,6 +6469,13 @@
   <p:clrMapOvr>
     <a:masterClrMapping/>
   </p:clrMapOvr>
+  <p:timing>
+    <p:tnLst>
+      <p:par>
+        <p:cTn id="1" dur="indefinite" restart="never" nodeType="tmRoot"/>
+      </p:par>
+    </p:tnLst>
+  </p:timing>
 </p:sld>
 </file>
 
@@ -6492,10 +6569,10 @@
         </p:nvGrpSpPr>
         <p:grpSpPr>
           <a:xfrm>
-            <a:off x="3132597" y="2400300"/>
-            <a:ext cx="10740827" cy="3864329"/>
-            <a:chOff x="0" y="0"/>
-            <a:chExt cx="14321102" cy="5152439"/>
+            <a:off x="3132597" y="2607469"/>
+            <a:ext cx="10740827" cy="4171659"/>
+            <a:chOff x="0" y="276225"/>
+            <a:chExt cx="14321102" cy="5562213"/>
           </a:xfrm>
         </p:grpSpPr>
         <p:sp>
@@ -6545,7 +6622,7 @@
           <p:spPr>
             <a:xfrm>
               <a:off x="0" y="4504739"/>
-              <a:ext cx="14321102" cy="647700"/>
+              <a:ext cx="14321102" cy="1333699"/>
             </a:xfrm>
             <a:prstGeom prst="rect">
               <a:avLst/>
@@ -6563,13 +6640,31 @@
                 </a:lnSpc>
               </a:pPr>
               <a:r>
-                <a:rPr lang="en-US" sz="3000" spc="270">
+                <a:rPr lang="en-US" sz="3000" spc="270" dirty="0">
                   <a:solidFill>
                     <a:srgbClr val="202020"/>
                   </a:solidFill>
                   <a:latin typeface="Montserrat Classic"/>
                 </a:rPr>
-                <a:t>O DIA EM QUE MINHA MENTE MUDOU DE RITMO</a:t>
+                <a:t>O </a:t>
+              </a:r>
+              <a:r>
+                <a:rPr lang="en-US" sz="3000" spc="270" dirty="0" smtClean="0">
+                  <a:solidFill>
+                    <a:srgbClr val="202020"/>
+                  </a:solidFill>
+                  <a:latin typeface="Montserrat Classic"/>
+                </a:rPr>
+                <a:t>ANO </a:t>
+              </a:r>
+              <a:r>
+                <a:rPr lang="en-US" sz="3000" spc="270" dirty="0">
+                  <a:solidFill>
+                    <a:srgbClr val="202020"/>
+                  </a:solidFill>
+                  <a:latin typeface="Montserrat Classic"/>
+                </a:rPr>
+                <a:t>EM QUE MINHA MENTE MUDOU DE RITMO</a:t>
               </a:r>
             </a:p>
           </p:txBody>
@@ -6609,7 +6704,7 @@
                 <a14:useLocalDpi xmlns:a14="http://schemas.microsoft.com/office/drawing/2010/main" val="0"/>
               </a:ext>
               <a:ext uri="{96DAC541-7B7A-43D3-8B79-37D633B846F1}">
-                <asvg:svgBlip xmlns="" xmlns:asvg="http://schemas.microsoft.com/office/drawing/2016/SVG/main" r:embed="rId3"/>
+                <asvg:svgBlip xmlns:asvg="http://schemas.microsoft.com/office/drawing/2016/SVG/main" xmlns="" r:embed="rId3"/>
               </a:ext>
             </a:extLst>
           </a:blip>
@@ -6657,7 +6752,7 @@
                   <a14:useLocalDpi xmlns:a14="http://schemas.microsoft.com/office/drawing/2010/main" val="0"/>
                 </a:ext>
                 <a:ext uri="{96DAC541-7B7A-43D3-8B79-37D633B846F1}">
-                  <asvg:svgBlip xmlns="" xmlns:asvg="http://schemas.microsoft.com/office/drawing/2016/SVG/main" r:embed="rId5"/>
+                  <asvg:svgBlip xmlns:asvg="http://schemas.microsoft.com/office/drawing/2016/SVG/main" xmlns="" r:embed="rId5"/>
                 </a:ext>
               </a:extLst>
             </a:blip>
@@ -6691,7 +6786,7 @@
                   <a14:useLocalDpi xmlns:a14="http://schemas.microsoft.com/office/drawing/2010/main" val="0"/>
                 </a:ext>
                 <a:ext uri="{96DAC541-7B7A-43D3-8B79-37D633B846F1}">
-                  <asvg:svgBlip xmlns="" xmlns:asvg="http://schemas.microsoft.com/office/drawing/2016/SVG/main" r:embed="rId5"/>
+                  <asvg:svgBlip xmlns:asvg="http://schemas.microsoft.com/office/drawing/2016/SVG/main" xmlns="" r:embed="rId5"/>
                 </a:ext>
               </a:extLst>
             </a:blip>
@@ -6725,7 +6820,7 @@
                   <a14:useLocalDpi xmlns:a14="http://schemas.microsoft.com/office/drawing/2010/main" val="0"/>
                 </a:ext>
                 <a:ext uri="{96DAC541-7B7A-43D3-8B79-37D633B846F1}">
-                  <asvg:svgBlip xmlns="" xmlns:asvg="http://schemas.microsoft.com/office/drawing/2016/SVG/main" r:embed="rId5"/>
+                  <asvg:svgBlip xmlns:asvg="http://schemas.microsoft.com/office/drawing/2016/SVG/main" xmlns="" r:embed="rId5"/>
                 </a:ext>
               </a:extLst>
             </a:blip>
@@ -6750,6 +6845,13 @@
   <p:clrMapOvr>
     <a:masterClrMapping/>
   </p:clrMapOvr>
+  <p:timing>
+    <p:tnLst>
+      <p:par>
+        <p:cTn id="1" dur="indefinite" restart="never" nodeType="tmRoot"/>
+      </p:par>
+    </p:tnLst>
+  </p:timing>
 </p:sld>
 </file>
 
@@ -6818,7 +6920,7 @@
                 <a14:useLocalDpi xmlns:a14="http://schemas.microsoft.com/office/drawing/2010/main" val="0"/>
               </a:ext>
               <a:ext uri="{96DAC541-7B7A-43D3-8B79-37D633B846F1}">
-                <asvg:svgBlip xmlns="" xmlns:asvg="http://schemas.microsoft.com/office/drawing/2016/SVG/main" r:embed="rId4"/>
+                <asvg:svgBlip xmlns:asvg="http://schemas.microsoft.com/office/drawing/2016/SVG/main" xmlns="" r:embed="rId4"/>
               </a:ext>
             </a:extLst>
           </a:blip>
@@ -7009,6 +7111,13 @@
   <p:clrMapOvr>
     <a:masterClrMapping/>
   </p:clrMapOvr>
+  <p:timing>
+    <p:tnLst>
+      <p:par>
+        <p:cTn id="1" dur="indefinite" restart="never" nodeType="tmRoot"/>
+      </p:par>
+    </p:tnLst>
+  </p:timing>
 </p:sld>
 </file>
 
@@ -7380,6 +7489,13 @@
   <p:clrMapOvr>
     <a:masterClrMapping/>
   </p:clrMapOvr>
+  <p:timing>
+    <p:tnLst>
+      <p:par>
+        <p:cTn id="1" dur="indefinite" restart="never" nodeType="tmRoot"/>
+      </p:par>
+    </p:tnLst>
+  </p:timing>
 </p:sld>
 </file>
 
@@ -7462,6 +7578,13 @@
   <p:clrMapOvr>
     <a:masterClrMapping/>
   </p:clrMapOvr>
+  <p:timing>
+    <p:tnLst>
+      <p:par>
+        <p:cTn id="1" dur="indefinite" restart="never" nodeType="tmRoot"/>
+      </p:par>
+    </p:tnLst>
+  </p:timing>
 </p:sld>
 </file>
 
@@ -7543,7 +7666,7 @@
                 <a14:useLocalDpi xmlns:a14="http://schemas.microsoft.com/office/drawing/2010/main" val="0"/>
               </a:ext>
               <a:ext uri="{96DAC541-7B7A-43D3-8B79-37D633B846F1}">
-                <asvg:svgBlip xmlns="" xmlns:asvg="http://schemas.microsoft.com/office/drawing/2016/SVG/main" r:embed="rId3"/>
+                <asvg:svgBlip xmlns:asvg="http://schemas.microsoft.com/office/drawing/2016/SVG/main" xmlns="" r:embed="rId3"/>
               </a:ext>
             </a:extLst>
           </a:blip>
@@ -7591,7 +7714,7 @@
                   <a14:useLocalDpi xmlns:a14="http://schemas.microsoft.com/office/drawing/2010/main" val="0"/>
                 </a:ext>
                 <a:ext uri="{96DAC541-7B7A-43D3-8B79-37D633B846F1}">
-                  <asvg:svgBlip xmlns="" xmlns:asvg="http://schemas.microsoft.com/office/drawing/2016/SVG/main" r:embed="rId5"/>
+                  <asvg:svgBlip xmlns:asvg="http://schemas.microsoft.com/office/drawing/2016/SVG/main" xmlns="" r:embed="rId5"/>
                 </a:ext>
               </a:extLst>
             </a:blip>
@@ -7625,7 +7748,7 @@
                   <a14:useLocalDpi xmlns:a14="http://schemas.microsoft.com/office/drawing/2010/main" val="0"/>
                 </a:ext>
                 <a:ext uri="{96DAC541-7B7A-43D3-8B79-37D633B846F1}">
-                  <asvg:svgBlip xmlns="" xmlns:asvg="http://schemas.microsoft.com/office/drawing/2016/SVG/main" r:embed="rId5"/>
+                  <asvg:svgBlip xmlns:asvg="http://schemas.microsoft.com/office/drawing/2016/SVG/main" xmlns="" r:embed="rId5"/>
                 </a:ext>
               </a:extLst>
             </a:blip>
@@ -7659,7 +7782,7 @@
                   <a14:useLocalDpi xmlns:a14="http://schemas.microsoft.com/office/drawing/2010/main" val="0"/>
                 </a:ext>
                 <a:ext uri="{96DAC541-7B7A-43D3-8B79-37D633B846F1}">
-                  <asvg:svgBlip xmlns="" xmlns:asvg="http://schemas.microsoft.com/office/drawing/2016/SVG/main" r:embed="rId5"/>
+                  <asvg:svgBlip xmlns:asvg="http://schemas.microsoft.com/office/drawing/2016/SVG/main" xmlns="" r:embed="rId5"/>
                 </a:ext>
               </a:extLst>
             </a:blip>
@@ -7895,6 +8018,13 @@
   <p:clrMapOvr>
     <a:masterClrMapping/>
   </p:clrMapOvr>
+  <p:timing>
+    <p:tnLst>
+      <p:par>
+        <p:cTn id="1" dur="indefinite" restart="never" nodeType="tmRoot"/>
+      </p:par>
+    </p:tnLst>
+  </p:timing>
 </p:sld>
 </file>
 

</xml_diff>

<commit_message>
Alteração Na Ordem dos Slides
</commit_message>
<xml_diff>
--- a/T.I/PPT/Aoresentação INAD.pptx
+++ b/T.I/PPT/Aoresentação INAD.pptx
@@ -18,38 +18,38 @@
     <p:sldId id="266" r:id="rId12"/>
     <p:sldId id="267" r:id="rId13"/>
     <p:sldId id="268" r:id="rId14"/>
-    <p:sldId id="269" r:id="rId15"/>
-    <p:sldId id="270" r:id="rId16"/>
+    <p:sldId id="270" r:id="rId15"/>
+    <p:sldId id="269" r:id="rId16"/>
     <p:sldId id="271" r:id="rId17"/>
   </p:sldIdLst>
   <p:sldSz cx="18288000" cy="10287000"/>
   <p:notesSz cx="6858000" cy="9144000"/>
   <p:embeddedFontLst>
     <p:embeddedFont>
+      <p:font typeface="Open Sans Extra Bold" panose="020B0604020202020204" charset="0"/>
+      <p:regular r:id="rId18"/>
+    </p:embeddedFont>
+    <p:embeddedFont>
+      <p:font typeface="Death to Metal" pitchFamily="2" charset="0"/>
+      <p:regular r:id="rId19"/>
+    </p:embeddedFont>
+    <p:embeddedFont>
       <p:font typeface="Calibri" panose="020F0502020204030204" pitchFamily="34" charset="0"/>
-      <p:regular r:id="rId18"/>
-      <p:bold r:id="rId19"/>
-      <p:italic r:id="rId20"/>
-      <p:boldItalic r:id="rId21"/>
+      <p:regular r:id="rId20"/>
+      <p:bold r:id="rId21"/>
+      <p:italic r:id="rId22"/>
+      <p:boldItalic r:id="rId23"/>
+    </p:embeddedFont>
+    <p:embeddedFont>
+      <p:font typeface="MetalShred" panose="02000500000000000000" pitchFamily="2" charset="0"/>
+      <p:regular r:id="rId24"/>
     </p:embeddedFont>
     <p:embeddedFont>
       <p:font typeface="Montserrat Classic Bold" panose="020B0604020202020204" charset="0"/>
-      <p:regular r:id="rId22"/>
+      <p:regular r:id="rId25"/>
     </p:embeddedFont>
     <p:embeddedFont>
       <p:font typeface="Metal Lord" panose="04010000000000000000" pitchFamily="82" charset="0"/>
-      <p:regular r:id="rId23"/>
-    </p:embeddedFont>
-    <p:embeddedFont>
-      <p:font typeface="Open Sans Extra Bold" panose="020B0604020202020204" charset="0"/>
-      <p:regular r:id="rId24"/>
-    </p:embeddedFont>
-    <p:embeddedFont>
-      <p:font typeface="Death to Metal" pitchFamily="2" charset="0"/>
-      <p:regular r:id="rId25"/>
-    </p:embeddedFont>
-    <p:embeddedFont>
-      <p:font typeface="MetalShred" panose="02000500000000000000" pitchFamily="2" charset="0"/>
       <p:regular r:id="rId26"/>
     </p:embeddedFont>
     <p:embeddedFont>
@@ -357,7 +357,7 @@
             <a:fld id="{1D8BD707-D9CF-40AE-B4C6-C98DA3205C09}" type="datetimeFigureOut">
               <a:rPr lang="en-US" smtClean="0"/>
               <a:pPr/>
-              <a:t>6/6/2021</a:t>
+              <a:t>6/7/2021</a:t>
             </a:fld>
             <a:endParaRPr lang="en-US"/>
           </a:p>
@@ -524,7 +524,7 @@
             <a:fld id="{1D8BD707-D9CF-40AE-B4C6-C98DA3205C09}" type="datetimeFigureOut">
               <a:rPr lang="en-US" smtClean="0"/>
               <a:pPr/>
-              <a:t>6/6/2021</a:t>
+              <a:t>6/7/2021</a:t>
             </a:fld>
             <a:endParaRPr lang="en-US"/>
           </a:p>
@@ -701,7 +701,7 @@
             <a:fld id="{1D8BD707-D9CF-40AE-B4C6-C98DA3205C09}" type="datetimeFigureOut">
               <a:rPr lang="en-US" smtClean="0"/>
               <a:pPr/>
-              <a:t>6/6/2021</a:t>
+              <a:t>6/7/2021</a:t>
             </a:fld>
             <a:endParaRPr lang="en-US"/>
           </a:p>
@@ -868,7 +868,7 @@
             <a:fld id="{1D8BD707-D9CF-40AE-B4C6-C98DA3205C09}" type="datetimeFigureOut">
               <a:rPr lang="en-US" smtClean="0"/>
               <a:pPr/>
-              <a:t>6/6/2021</a:t>
+              <a:t>6/7/2021</a:t>
             </a:fld>
             <a:endParaRPr lang="en-US"/>
           </a:p>
@@ -1111,7 +1111,7 @@
             <a:fld id="{1D8BD707-D9CF-40AE-B4C6-C98DA3205C09}" type="datetimeFigureOut">
               <a:rPr lang="en-US" smtClean="0"/>
               <a:pPr/>
-              <a:t>6/6/2021</a:t>
+              <a:t>6/7/2021</a:t>
             </a:fld>
             <a:endParaRPr lang="en-US"/>
           </a:p>
@@ -1396,7 +1396,7 @@
             <a:fld id="{1D8BD707-D9CF-40AE-B4C6-C98DA3205C09}" type="datetimeFigureOut">
               <a:rPr lang="en-US" smtClean="0"/>
               <a:pPr/>
-              <a:t>6/6/2021</a:t>
+              <a:t>6/7/2021</a:t>
             </a:fld>
             <a:endParaRPr lang="en-US"/>
           </a:p>
@@ -1815,7 +1815,7 @@
             <a:fld id="{1D8BD707-D9CF-40AE-B4C6-C98DA3205C09}" type="datetimeFigureOut">
               <a:rPr lang="en-US" smtClean="0"/>
               <a:pPr/>
-              <a:t>6/6/2021</a:t>
+              <a:t>6/7/2021</a:t>
             </a:fld>
             <a:endParaRPr lang="en-US"/>
           </a:p>
@@ -1930,7 +1930,7 @@
             <a:fld id="{1D8BD707-D9CF-40AE-B4C6-C98DA3205C09}" type="datetimeFigureOut">
               <a:rPr lang="en-US" smtClean="0"/>
               <a:pPr/>
-              <a:t>6/6/2021</a:t>
+              <a:t>6/7/2021</a:t>
             </a:fld>
             <a:endParaRPr lang="en-US"/>
           </a:p>
@@ -2022,7 +2022,7 @@
             <a:fld id="{1D8BD707-D9CF-40AE-B4C6-C98DA3205C09}" type="datetimeFigureOut">
               <a:rPr lang="en-US" smtClean="0"/>
               <a:pPr/>
-              <a:t>6/6/2021</a:t>
+              <a:t>6/7/2021</a:t>
             </a:fld>
             <a:endParaRPr lang="en-US"/>
           </a:p>
@@ -2296,7 +2296,7 @@
             <a:fld id="{1D8BD707-D9CF-40AE-B4C6-C98DA3205C09}" type="datetimeFigureOut">
               <a:rPr lang="en-US" smtClean="0"/>
               <a:pPr/>
-              <a:t>6/6/2021</a:t>
+              <a:t>6/7/2021</a:t>
             </a:fld>
             <a:endParaRPr lang="en-US"/>
           </a:p>
@@ -2546,7 +2546,7 @@
             <a:fld id="{1D8BD707-D9CF-40AE-B4C6-C98DA3205C09}" type="datetimeFigureOut">
               <a:rPr lang="en-US" smtClean="0"/>
               <a:pPr/>
-              <a:t>6/6/2021</a:t>
+              <a:t>6/7/2021</a:t>
             </a:fld>
             <a:endParaRPr lang="en-US"/>
           </a:p>
@@ -2756,7 +2756,7 @@
             <a:fld id="{1D8BD707-D9CF-40AE-B4C6-C98DA3205C09}" type="datetimeFigureOut">
               <a:rPr lang="en-US" smtClean="0"/>
               <a:pPr/>
-              <a:t>6/6/2021</a:t>
+              <a:t>6/7/2021</a:t>
             </a:fld>
             <a:endParaRPr lang="en-US"/>
           </a:p>
@@ -3354,7 +3354,7 @@
                 <a14:useLocalDpi xmlns:a14="http://schemas.microsoft.com/office/drawing/2010/main" val="0"/>
               </a:ext>
               <a:ext uri="{96DAC541-7B7A-43D3-8B79-37D633B846F1}">
-                <asvg:svgBlip xmlns:asvg="http://schemas.microsoft.com/office/drawing/2016/SVG/main" xmlns="" r:embed="rId3"/>
+                <asvg:svgBlip xmlns="" xmlns:asvg="http://schemas.microsoft.com/office/drawing/2016/SVG/main" r:embed="rId3"/>
               </a:ext>
             </a:extLst>
           </a:blip>
@@ -3402,7 +3402,7 @@
                   <a14:useLocalDpi xmlns:a14="http://schemas.microsoft.com/office/drawing/2010/main" val="0"/>
                 </a:ext>
                 <a:ext uri="{96DAC541-7B7A-43D3-8B79-37D633B846F1}">
-                  <asvg:svgBlip xmlns:asvg="http://schemas.microsoft.com/office/drawing/2016/SVG/main" xmlns="" r:embed="rId5"/>
+                  <asvg:svgBlip xmlns="" xmlns:asvg="http://schemas.microsoft.com/office/drawing/2016/SVG/main" r:embed="rId5"/>
                 </a:ext>
               </a:extLst>
             </a:blip>
@@ -3436,7 +3436,7 @@
                   <a14:useLocalDpi xmlns:a14="http://schemas.microsoft.com/office/drawing/2010/main" val="0"/>
                 </a:ext>
                 <a:ext uri="{96DAC541-7B7A-43D3-8B79-37D633B846F1}">
-                  <asvg:svgBlip xmlns:asvg="http://schemas.microsoft.com/office/drawing/2016/SVG/main" xmlns="" r:embed="rId5"/>
+                  <asvg:svgBlip xmlns="" xmlns:asvg="http://schemas.microsoft.com/office/drawing/2016/SVG/main" r:embed="rId5"/>
                 </a:ext>
               </a:extLst>
             </a:blip>
@@ -3470,7 +3470,7 @@
                   <a14:useLocalDpi xmlns:a14="http://schemas.microsoft.com/office/drawing/2010/main" val="0"/>
                 </a:ext>
                 <a:ext uri="{96DAC541-7B7A-43D3-8B79-37D633B846F1}">
-                  <asvg:svgBlip xmlns:asvg="http://schemas.microsoft.com/office/drawing/2016/SVG/main" xmlns="" r:embed="rId5"/>
+                  <asvg:svgBlip xmlns="" xmlns:asvg="http://schemas.microsoft.com/office/drawing/2016/SVG/main" r:embed="rId5"/>
                 </a:ext>
               </a:extLst>
             </a:blip>
@@ -4423,7 +4423,7 @@
                 <a14:useLocalDpi xmlns:a14="http://schemas.microsoft.com/office/drawing/2010/main" val="0"/>
               </a:ext>
               <a:ext uri="{96DAC541-7B7A-43D3-8B79-37D633B846F1}">
-                <asvg:svgBlip xmlns:asvg="http://schemas.microsoft.com/office/drawing/2016/SVG/main" xmlns="" r:embed="rId3"/>
+                <asvg:svgBlip xmlns="" xmlns:asvg="http://schemas.microsoft.com/office/drawing/2016/SVG/main" r:embed="rId3"/>
               </a:ext>
             </a:extLst>
           </a:blip>
@@ -4490,7 +4490,7 @@
                   <a14:useLocalDpi xmlns:a14="http://schemas.microsoft.com/office/drawing/2010/main" val="0"/>
                 </a:ext>
                 <a:ext uri="{96DAC541-7B7A-43D3-8B79-37D633B846F1}">
-                  <asvg:svgBlip xmlns:asvg="http://schemas.microsoft.com/office/drawing/2016/SVG/main" xmlns="" r:embed="rId5"/>
+                  <asvg:svgBlip xmlns="" xmlns:asvg="http://schemas.microsoft.com/office/drawing/2016/SVG/main" r:embed="rId5"/>
                 </a:ext>
               </a:extLst>
             </a:blip>
@@ -4524,7 +4524,7 @@
                   <a14:useLocalDpi xmlns:a14="http://schemas.microsoft.com/office/drawing/2010/main" val="0"/>
                 </a:ext>
                 <a:ext uri="{96DAC541-7B7A-43D3-8B79-37D633B846F1}">
-                  <asvg:svgBlip xmlns:asvg="http://schemas.microsoft.com/office/drawing/2016/SVG/main" xmlns="" r:embed="rId5"/>
+                  <asvg:svgBlip xmlns="" xmlns:asvg="http://schemas.microsoft.com/office/drawing/2016/SVG/main" r:embed="rId5"/>
                 </a:ext>
               </a:extLst>
             </a:blip>
@@ -4558,7 +4558,7 @@
                   <a14:useLocalDpi xmlns:a14="http://schemas.microsoft.com/office/drawing/2010/main" val="0"/>
                 </a:ext>
                 <a:ext uri="{96DAC541-7B7A-43D3-8B79-37D633B846F1}">
-                  <asvg:svgBlip xmlns:asvg="http://schemas.microsoft.com/office/drawing/2016/SVG/main" xmlns="" r:embed="rId5"/>
+                  <asvg:svgBlip xmlns="" xmlns:asvg="http://schemas.microsoft.com/office/drawing/2016/SVG/main" r:embed="rId5"/>
                 </a:ext>
               </a:extLst>
             </a:blip>
@@ -4670,114 +4670,6 @@
         </p:nvSpPr>
         <p:spPr>
           <a:xfrm>
-            <a:off x="0" y="-38100"/>
-            <a:ext cx="1066800" cy="10972800"/>
-          </a:xfrm>
-          <a:prstGeom prst="rect">
-            <a:avLst/>
-          </a:prstGeom>
-          <a:solidFill>
-            <a:srgbClr val="FF4343"/>
-          </a:solidFill>
-        </p:spPr>
-      </p:sp>
-      <p:pic>
-        <p:nvPicPr>
-          <p:cNvPr id="5" name="Imagem 4"/>
-          <p:cNvPicPr>
-            <a:picLocks noChangeAspect="1"/>
-          </p:cNvPicPr>
-          <p:nvPr/>
-        </p:nvPicPr>
-        <p:blipFill>
-          <a:blip r:embed="rId2">
-            <a:extLst>
-              <a:ext uri="{28A0092B-C50C-407E-A947-70E740481C1C}">
-                <a14:useLocalDpi xmlns:a14="http://schemas.microsoft.com/office/drawing/2010/main" val="0"/>
-              </a:ext>
-            </a:extLst>
-          </a:blip>
-          <a:stretch>
-            <a:fillRect/>
-          </a:stretch>
-        </p:blipFill>
-        <p:spPr>
-          <a:xfrm>
-            <a:off x="1676400" y="1104900"/>
-            <a:ext cx="15697200" cy="8829675"/>
-          </a:xfrm>
-          <a:prstGeom prst="rect">
-            <a:avLst/>
-          </a:prstGeom>
-        </p:spPr>
-      </p:pic>
-    </p:spTree>
-  </p:cSld>
-  <p:clrMapOvr>
-    <a:masterClrMapping/>
-  </p:clrMapOvr>
-  <p:timing>
-    <p:tnLst>
-      <p:par>
-        <p:cTn id="1" dur="indefinite" restart="never" nodeType="tmRoot"/>
-      </p:par>
-    </p:tnLst>
-  </p:timing>
-</p:sld>
-</file>
-
-<file path=ppt/slides/slide15.xml><?xml version="1.0" encoding="utf-8"?>
-<p:sld xmlns:a="http://schemas.openxmlformats.org/drawingml/2006/main" xmlns:r="http://schemas.openxmlformats.org/officeDocument/2006/relationships" xmlns:p="http://schemas.openxmlformats.org/presentationml/2006/main">
-  <p:cSld>
-    <p:bg>
-      <p:bgPr>
-        <a:solidFill>
-          <a:srgbClr val="F4F4F4"/>
-        </a:solidFill>
-        <a:effectLst/>
-      </p:bgPr>
-    </p:bg>
-    <p:spTree>
-      <p:nvGrpSpPr>
-        <p:cNvPr id="1" name=""/>
-        <p:cNvGrpSpPr/>
-        <p:nvPr/>
-      </p:nvGrpSpPr>
-      <p:grpSpPr>
-        <a:xfrm>
-          <a:off x="0" y="0"/>
-          <a:ext cx="0" cy="0"/>
-          <a:chOff x="0" y="0"/>
-          <a:chExt cx="0" cy="0"/>
-        </a:xfrm>
-      </p:grpSpPr>
-      <p:sp>
-        <p:nvSpPr>
-          <p:cNvPr id="2" name="AutoShape 2"/>
-          <p:cNvSpPr/>
-          <p:nvPr/>
-        </p:nvSpPr>
-        <p:spPr>
-          <a:xfrm>
-            <a:off x="17935575" y="2113598"/>
-            <a:ext cx="38100" cy="8229600"/>
-          </a:xfrm>
-          <a:prstGeom prst="rect">
-            <a:avLst/>
-          </a:prstGeom>
-          <a:solidFill>
-            <a:srgbClr val="202020"/>
-          </a:solidFill>
-        </p:spPr>
-      </p:sp>
-      <p:sp>
-        <p:nvSpPr>
-          <p:cNvPr id="3" name="AutoShape 3"/>
-          <p:cNvSpPr/>
-          <p:nvPr/>
-        </p:nvSpPr>
-        <p:spPr>
-          <a:xfrm>
             <a:off x="15619081" y="8157216"/>
             <a:ext cx="3268994" cy="2129784"/>
           </a:xfrm>
@@ -4837,7 +4729,7 @@
                   <a14:useLocalDpi xmlns:a14="http://schemas.microsoft.com/office/drawing/2010/main" val="0"/>
                 </a:ext>
                 <a:ext uri="{96DAC541-7B7A-43D3-8B79-37D633B846F1}">
-                  <asvg:svgBlip xmlns:asvg="http://schemas.microsoft.com/office/drawing/2016/SVG/main" xmlns="" r:embed="rId3"/>
+                  <asvg:svgBlip xmlns="" xmlns:asvg="http://schemas.microsoft.com/office/drawing/2016/SVG/main" r:embed="rId3"/>
                 </a:ext>
               </a:extLst>
             </a:blip>
@@ -4871,7 +4763,7 @@
                   <a14:useLocalDpi xmlns:a14="http://schemas.microsoft.com/office/drawing/2010/main" val="0"/>
                 </a:ext>
                 <a:ext uri="{96DAC541-7B7A-43D3-8B79-37D633B846F1}">
-                  <asvg:svgBlip xmlns:asvg="http://schemas.microsoft.com/office/drawing/2016/SVG/main" xmlns="" r:embed="rId3"/>
+                  <asvg:svgBlip xmlns="" xmlns:asvg="http://schemas.microsoft.com/office/drawing/2016/SVG/main" r:embed="rId3"/>
                 </a:ext>
               </a:extLst>
             </a:blip>
@@ -4905,7 +4797,7 @@
                   <a14:useLocalDpi xmlns:a14="http://schemas.microsoft.com/office/drawing/2010/main" val="0"/>
                 </a:ext>
                 <a:ext uri="{96DAC541-7B7A-43D3-8B79-37D633B846F1}">
-                  <asvg:svgBlip xmlns:asvg="http://schemas.microsoft.com/office/drawing/2016/SVG/main" xmlns="" r:embed="rId3"/>
+                  <asvg:svgBlip xmlns="" xmlns:asvg="http://schemas.microsoft.com/office/drawing/2016/SVG/main" r:embed="rId3"/>
                 </a:ext>
               </a:extLst>
             </a:blip>
@@ -5056,6 +4948,114 @@
 </p:sld>
 </file>
 
+<file path=ppt/slides/slide15.xml><?xml version="1.0" encoding="utf-8"?>
+<p:sld xmlns:a="http://schemas.openxmlformats.org/drawingml/2006/main" xmlns:r="http://schemas.openxmlformats.org/officeDocument/2006/relationships" xmlns:p="http://schemas.openxmlformats.org/presentationml/2006/main">
+  <p:cSld>
+    <p:bg>
+      <p:bgPr>
+        <a:solidFill>
+          <a:srgbClr val="F4F4F4"/>
+        </a:solidFill>
+        <a:effectLst/>
+      </p:bgPr>
+    </p:bg>
+    <p:spTree>
+      <p:nvGrpSpPr>
+        <p:cNvPr id="1" name=""/>
+        <p:cNvGrpSpPr/>
+        <p:nvPr/>
+      </p:nvGrpSpPr>
+      <p:grpSpPr>
+        <a:xfrm>
+          <a:off x="0" y="0"/>
+          <a:ext cx="0" cy="0"/>
+          <a:chOff x="0" y="0"/>
+          <a:chExt cx="0" cy="0"/>
+        </a:xfrm>
+      </p:grpSpPr>
+      <p:sp>
+        <p:nvSpPr>
+          <p:cNvPr id="2" name="AutoShape 2"/>
+          <p:cNvSpPr/>
+          <p:nvPr/>
+        </p:nvSpPr>
+        <p:spPr>
+          <a:xfrm>
+            <a:off x="17935575" y="2113598"/>
+            <a:ext cx="38100" cy="8229600"/>
+          </a:xfrm>
+          <a:prstGeom prst="rect">
+            <a:avLst/>
+          </a:prstGeom>
+          <a:solidFill>
+            <a:srgbClr val="202020"/>
+          </a:solidFill>
+        </p:spPr>
+      </p:sp>
+      <p:sp>
+        <p:nvSpPr>
+          <p:cNvPr id="3" name="AutoShape 3"/>
+          <p:cNvSpPr/>
+          <p:nvPr/>
+        </p:nvSpPr>
+        <p:spPr>
+          <a:xfrm>
+            <a:off x="0" y="-38100"/>
+            <a:ext cx="1066800" cy="10972800"/>
+          </a:xfrm>
+          <a:prstGeom prst="rect">
+            <a:avLst/>
+          </a:prstGeom>
+          <a:solidFill>
+            <a:srgbClr val="FF4343"/>
+          </a:solidFill>
+        </p:spPr>
+      </p:sp>
+      <p:pic>
+        <p:nvPicPr>
+          <p:cNvPr id="5" name="Imagem 4"/>
+          <p:cNvPicPr>
+            <a:picLocks noChangeAspect="1"/>
+          </p:cNvPicPr>
+          <p:nvPr/>
+        </p:nvPicPr>
+        <p:blipFill>
+          <a:blip r:embed="rId2">
+            <a:extLst>
+              <a:ext uri="{28A0092B-C50C-407E-A947-70E740481C1C}">
+                <a14:useLocalDpi xmlns:a14="http://schemas.microsoft.com/office/drawing/2010/main" val="0"/>
+              </a:ext>
+            </a:extLst>
+          </a:blip>
+          <a:stretch>
+            <a:fillRect/>
+          </a:stretch>
+        </p:blipFill>
+        <p:spPr>
+          <a:xfrm>
+            <a:off x="1676400" y="1104900"/>
+            <a:ext cx="15697200" cy="8829675"/>
+          </a:xfrm>
+          <a:prstGeom prst="rect">
+            <a:avLst/>
+          </a:prstGeom>
+        </p:spPr>
+      </p:pic>
+    </p:spTree>
+  </p:cSld>
+  <p:clrMapOvr>
+    <a:masterClrMapping/>
+  </p:clrMapOvr>
+  <p:timing>
+    <p:tnLst>
+      <p:par>
+        <p:cTn id="1" dur="indefinite" restart="never" nodeType="tmRoot"/>
+      </p:par>
+    </p:tnLst>
+  </p:timing>
+</p:sld>
+</file>
+
 <file path=ppt/slides/slide16.xml><?xml version="1.0" encoding="utf-8"?>
 <p:sld xmlns:a="http://schemas.openxmlformats.org/drawingml/2006/main" xmlns:r="http://schemas.openxmlformats.org/officeDocument/2006/relationships" xmlns:p="http://schemas.openxmlformats.org/presentationml/2006/main">
   <p:cSld>
@@ -5115,7 +5115,7 @@
                 <a14:useLocalDpi xmlns:a14="http://schemas.microsoft.com/office/drawing/2010/main" val="0"/>
               </a:ext>
               <a:ext uri="{96DAC541-7B7A-43D3-8B79-37D633B846F1}">
-                <asvg:svgBlip xmlns:asvg="http://schemas.microsoft.com/office/drawing/2016/SVG/main" xmlns="" r:embed="rId3"/>
+                <asvg:svgBlip xmlns="" xmlns:asvg="http://schemas.microsoft.com/office/drawing/2016/SVG/main" r:embed="rId3"/>
               </a:ext>
             </a:extLst>
           </a:blip>
@@ -5273,7 +5273,7 @@
                   <a14:useLocalDpi xmlns:a14="http://schemas.microsoft.com/office/drawing/2010/main" val="0"/>
                 </a:ext>
                 <a:ext uri="{96DAC541-7B7A-43D3-8B79-37D633B846F1}">
-                  <asvg:svgBlip xmlns:asvg="http://schemas.microsoft.com/office/drawing/2016/SVG/main" xmlns="" r:embed="rId5"/>
+                  <asvg:svgBlip xmlns="" xmlns:asvg="http://schemas.microsoft.com/office/drawing/2016/SVG/main" r:embed="rId5"/>
                 </a:ext>
               </a:extLst>
             </a:blip>
@@ -5307,7 +5307,7 @@
                   <a14:useLocalDpi xmlns:a14="http://schemas.microsoft.com/office/drawing/2010/main" val="0"/>
                 </a:ext>
                 <a:ext uri="{96DAC541-7B7A-43D3-8B79-37D633B846F1}">
-                  <asvg:svgBlip xmlns:asvg="http://schemas.microsoft.com/office/drawing/2016/SVG/main" xmlns="" r:embed="rId5"/>
+                  <asvg:svgBlip xmlns="" xmlns:asvg="http://schemas.microsoft.com/office/drawing/2016/SVG/main" r:embed="rId5"/>
                 </a:ext>
               </a:extLst>
             </a:blip>
@@ -5341,7 +5341,7 @@
                   <a14:useLocalDpi xmlns:a14="http://schemas.microsoft.com/office/drawing/2010/main" val="0"/>
                 </a:ext>
                 <a:ext uri="{96DAC541-7B7A-43D3-8B79-37D633B846F1}">
-                  <asvg:svgBlip xmlns:asvg="http://schemas.microsoft.com/office/drawing/2016/SVG/main" xmlns="" r:embed="rId5"/>
+                  <asvg:svgBlip xmlns="" xmlns:asvg="http://schemas.microsoft.com/office/drawing/2016/SVG/main" r:embed="rId5"/>
                 </a:ext>
               </a:extLst>
             </a:blip>
@@ -5454,7 +5454,7 @@
                 <a14:useLocalDpi xmlns:a14="http://schemas.microsoft.com/office/drawing/2010/main" val="0"/>
               </a:ext>
               <a:ext uri="{96DAC541-7B7A-43D3-8B79-37D633B846F1}">
-                <asvg:svgBlip xmlns:asvg="http://schemas.microsoft.com/office/drawing/2016/SVG/main" xmlns="" r:embed="rId3"/>
+                <asvg:svgBlip xmlns="" xmlns:asvg="http://schemas.microsoft.com/office/drawing/2016/SVG/main" r:embed="rId3"/>
               </a:ext>
             </a:extLst>
           </a:blip>
@@ -5502,7 +5502,7 @@
                   <a14:useLocalDpi xmlns:a14="http://schemas.microsoft.com/office/drawing/2010/main" val="0"/>
                 </a:ext>
                 <a:ext uri="{96DAC541-7B7A-43D3-8B79-37D633B846F1}">
-                  <asvg:svgBlip xmlns:asvg="http://schemas.microsoft.com/office/drawing/2016/SVG/main" xmlns="" r:embed="rId5"/>
+                  <asvg:svgBlip xmlns="" xmlns:asvg="http://schemas.microsoft.com/office/drawing/2016/SVG/main" r:embed="rId5"/>
                 </a:ext>
               </a:extLst>
             </a:blip>
@@ -5536,7 +5536,7 @@
                   <a14:useLocalDpi xmlns:a14="http://schemas.microsoft.com/office/drawing/2010/main" val="0"/>
                 </a:ext>
                 <a:ext uri="{96DAC541-7B7A-43D3-8B79-37D633B846F1}">
-                  <asvg:svgBlip xmlns:asvg="http://schemas.microsoft.com/office/drawing/2016/SVG/main" xmlns="" r:embed="rId5"/>
+                  <asvg:svgBlip xmlns="" xmlns:asvg="http://schemas.microsoft.com/office/drawing/2016/SVG/main" r:embed="rId5"/>
                 </a:ext>
               </a:extLst>
             </a:blip>
@@ -5570,7 +5570,7 @@
                   <a14:useLocalDpi xmlns:a14="http://schemas.microsoft.com/office/drawing/2010/main" val="0"/>
                 </a:ext>
                 <a:ext uri="{96DAC541-7B7A-43D3-8B79-37D633B846F1}">
-                  <asvg:svgBlip xmlns:asvg="http://schemas.microsoft.com/office/drawing/2016/SVG/main" xmlns="" r:embed="rId5"/>
+                  <asvg:svgBlip xmlns="" xmlns:asvg="http://schemas.microsoft.com/office/drawing/2016/SVG/main" r:embed="rId5"/>
                 </a:ext>
               </a:extLst>
             </a:blip>
@@ -5797,7 +5797,7 @@
                 <a14:useLocalDpi xmlns:a14="http://schemas.microsoft.com/office/drawing/2010/main" val="0"/>
               </a:ext>
               <a:ext uri="{96DAC541-7B7A-43D3-8B79-37D633B846F1}">
-                <asvg:svgBlip xmlns:asvg="http://schemas.microsoft.com/office/drawing/2016/SVG/main" xmlns="" r:embed="rId3"/>
+                <asvg:svgBlip xmlns="" xmlns:asvg="http://schemas.microsoft.com/office/drawing/2016/SVG/main" r:embed="rId3"/>
               </a:ext>
             </a:extLst>
           </a:blip>
@@ -5845,7 +5845,7 @@
                   <a14:useLocalDpi xmlns:a14="http://schemas.microsoft.com/office/drawing/2010/main" val="0"/>
                 </a:ext>
                 <a:ext uri="{96DAC541-7B7A-43D3-8B79-37D633B846F1}">
-                  <asvg:svgBlip xmlns:asvg="http://schemas.microsoft.com/office/drawing/2016/SVG/main" xmlns="" r:embed="rId5"/>
+                  <asvg:svgBlip xmlns="" xmlns:asvg="http://schemas.microsoft.com/office/drawing/2016/SVG/main" r:embed="rId5"/>
                 </a:ext>
               </a:extLst>
             </a:blip>
@@ -5879,7 +5879,7 @@
                   <a14:useLocalDpi xmlns:a14="http://schemas.microsoft.com/office/drawing/2010/main" val="0"/>
                 </a:ext>
                 <a:ext uri="{96DAC541-7B7A-43D3-8B79-37D633B846F1}">
-                  <asvg:svgBlip xmlns:asvg="http://schemas.microsoft.com/office/drawing/2016/SVG/main" xmlns="" r:embed="rId5"/>
+                  <asvg:svgBlip xmlns="" xmlns:asvg="http://schemas.microsoft.com/office/drawing/2016/SVG/main" r:embed="rId5"/>
                 </a:ext>
               </a:extLst>
             </a:blip>
@@ -5913,7 +5913,7 @@
                   <a14:useLocalDpi xmlns:a14="http://schemas.microsoft.com/office/drawing/2010/main" val="0"/>
                 </a:ext>
                 <a:ext uri="{96DAC541-7B7A-43D3-8B79-37D633B846F1}">
-                  <asvg:svgBlip xmlns:asvg="http://schemas.microsoft.com/office/drawing/2016/SVG/main" xmlns="" r:embed="rId5"/>
+                  <asvg:svgBlip xmlns="" xmlns:asvg="http://schemas.microsoft.com/office/drawing/2016/SVG/main" r:embed="rId5"/>
                 </a:ext>
               </a:extLst>
             </a:blip>
@@ -6140,7 +6140,7 @@
                 <a14:useLocalDpi xmlns:a14="http://schemas.microsoft.com/office/drawing/2010/main" val="0"/>
               </a:ext>
               <a:ext uri="{96DAC541-7B7A-43D3-8B79-37D633B846F1}">
-                <asvg:svgBlip xmlns:asvg="http://schemas.microsoft.com/office/drawing/2016/SVG/main" xmlns="" r:embed="rId3"/>
+                <asvg:svgBlip xmlns="" xmlns:asvg="http://schemas.microsoft.com/office/drawing/2016/SVG/main" r:embed="rId3"/>
               </a:ext>
             </a:extLst>
           </a:blip>
@@ -6188,7 +6188,7 @@
                   <a14:useLocalDpi xmlns:a14="http://schemas.microsoft.com/office/drawing/2010/main" val="0"/>
                 </a:ext>
                 <a:ext uri="{96DAC541-7B7A-43D3-8B79-37D633B846F1}">
-                  <asvg:svgBlip xmlns:asvg="http://schemas.microsoft.com/office/drawing/2016/SVG/main" xmlns="" r:embed="rId5"/>
+                  <asvg:svgBlip xmlns="" xmlns:asvg="http://schemas.microsoft.com/office/drawing/2016/SVG/main" r:embed="rId5"/>
                 </a:ext>
               </a:extLst>
             </a:blip>
@@ -6222,7 +6222,7 @@
                   <a14:useLocalDpi xmlns:a14="http://schemas.microsoft.com/office/drawing/2010/main" val="0"/>
                 </a:ext>
                 <a:ext uri="{96DAC541-7B7A-43D3-8B79-37D633B846F1}">
-                  <asvg:svgBlip xmlns:asvg="http://schemas.microsoft.com/office/drawing/2016/SVG/main" xmlns="" r:embed="rId5"/>
+                  <asvg:svgBlip xmlns="" xmlns:asvg="http://schemas.microsoft.com/office/drawing/2016/SVG/main" r:embed="rId5"/>
                 </a:ext>
               </a:extLst>
             </a:blip>
@@ -6256,7 +6256,7 @@
                   <a14:useLocalDpi xmlns:a14="http://schemas.microsoft.com/office/drawing/2010/main" val="0"/>
                 </a:ext>
                 <a:ext uri="{96DAC541-7B7A-43D3-8B79-37D633B846F1}">
-                  <asvg:svgBlip xmlns:asvg="http://schemas.microsoft.com/office/drawing/2016/SVG/main" xmlns="" r:embed="rId5"/>
+                  <asvg:svgBlip xmlns="" xmlns:asvg="http://schemas.microsoft.com/office/drawing/2016/SVG/main" r:embed="rId5"/>
                 </a:ext>
               </a:extLst>
             </a:blip>
@@ -6704,7 +6704,7 @@
                 <a14:useLocalDpi xmlns:a14="http://schemas.microsoft.com/office/drawing/2010/main" val="0"/>
               </a:ext>
               <a:ext uri="{96DAC541-7B7A-43D3-8B79-37D633B846F1}">
-                <asvg:svgBlip xmlns:asvg="http://schemas.microsoft.com/office/drawing/2016/SVG/main" xmlns="" r:embed="rId3"/>
+                <asvg:svgBlip xmlns="" xmlns:asvg="http://schemas.microsoft.com/office/drawing/2016/SVG/main" r:embed="rId3"/>
               </a:ext>
             </a:extLst>
           </a:blip>
@@ -6752,7 +6752,7 @@
                   <a14:useLocalDpi xmlns:a14="http://schemas.microsoft.com/office/drawing/2010/main" val="0"/>
                 </a:ext>
                 <a:ext uri="{96DAC541-7B7A-43D3-8B79-37D633B846F1}">
-                  <asvg:svgBlip xmlns:asvg="http://schemas.microsoft.com/office/drawing/2016/SVG/main" xmlns="" r:embed="rId5"/>
+                  <asvg:svgBlip xmlns="" xmlns:asvg="http://schemas.microsoft.com/office/drawing/2016/SVG/main" r:embed="rId5"/>
                 </a:ext>
               </a:extLst>
             </a:blip>
@@ -6786,7 +6786,7 @@
                   <a14:useLocalDpi xmlns:a14="http://schemas.microsoft.com/office/drawing/2010/main" val="0"/>
                 </a:ext>
                 <a:ext uri="{96DAC541-7B7A-43D3-8B79-37D633B846F1}">
-                  <asvg:svgBlip xmlns:asvg="http://schemas.microsoft.com/office/drawing/2016/SVG/main" xmlns="" r:embed="rId5"/>
+                  <asvg:svgBlip xmlns="" xmlns:asvg="http://schemas.microsoft.com/office/drawing/2016/SVG/main" r:embed="rId5"/>
                 </a:ext>
               </a:extLst>
             </a:blip>
@@ -6820,7 +6820,7 @@
                   <a14:useLocalDpi xmlns:a14="http://schemas.microsoft.com/office/drawing/2010/main" val="0"/>
                 </a:ext>
                 <a:ext uri="{96DAC541-7B7A-43D3-8B79-37D633B846F1}">
-                  <asvg:svgBlip xmlns:asvg="http://schemas.microsoft.com/office/drawing/2016/SVG/main" xmlns="" r:embed="rId5"/>
+                  <asvg:svgBlip xmlns="" xmlns:asvg="http://schemas.microsoft.com/office/drawing/2016/SVG/main" r:embed="rId5"/>
                 </a:ext>
               </a:extLst>
             </a:blip>
@@ -6920,7 +6920,7 @@
                 <a14:useLocalDpi xmlns:a14="http://schemas.microsoft.com/office/drawing/2010/main" val="0"/>
               </a:ext>
               <a:ext uri="{96DAC541-7B7A-43D3-8B79-37D633B846F1}">
-                <asvg:svgBlip xmlns:asvg="http://schemas.microsoft.com/office/drawing/2016/SVG/main" xmlns="" r:embed="rId4"/>
+                <asvg:svgBlip xmlns="" xmlns:asvg="http://schemas.microsoft.com/office/drawing/2016/SVG/main" r:embed="rId4"/>
               </a:ext>
             </a:extLst>
           </a:blip>
@@ -7666,7 +7666,7 @@
                 <a14:useLocalDpi xmlns:a14="http://schemas.microsoft.com/office/drawing/2010/main" val="0"/>
               </a:ext>
               <a:ext uri="{96DAC541-7B7A-43D3-8B79-37D633B846F1}">
-                <asvg:svgBlip xmlns:asvg="http://schemas.microsoft.com/office/drawing/2016/SVG/main" xmlns="" r:embed="rId3"/>
+                <asvg:svgBlip xmlns="" xmlns:asvg="http://schemas.microsoft.com/office/drawing/2016/SVG/main" r:embed="rId3"/>
               </a:ext>
             </a:extLst>
           </a:blip>
@@ -7714,7 +7714,7 @@
                   <a14:useLocalDpi xmlns:a14="http://schemas.microsoft.com/office/drawing/2010/main" val="0"/>
                 </a:ext>
                 <a:ext uri="{96DAC541-7B7A-43D3-8B79-37D633B846F1}">
-                  <asvg:svgBlip xmlns:asvg="http://schemas.microsoft.com/office/drawing/2016/SVG/main" xmlns="" r:embed="rId5"/>
+                  <asvg:svgBlip xmlns="" xmlns:asvg="http://schemas.microsoft.com/office/drawing/2016/SVG/main" r:embed="rId5"/>
                 </a:ext>
               </a:extLst>
             </a:blip>
@@ -7748,7 +7748,7 @@
                   <a14:useLocalDpi xmlns:a14="http://schemas.microsoft.com/office/drawing/2010/main" val="0"/>
                 </a:ext>
                 <a:ext uri="{96DAC541-7B7A-43D3-8B79-37D633B846F1}">
-                  <asvg:svgBlip xmlns:asvg="http://schemas.microsoft.com/office/drawing/2016/SVG/main" xmlns="" r:embed="rId5"/>
+                  <asvg:svgBlip xmlns="" xmlns:asvg="http://schemas.microsoft.com/office/drawing/2016/SVG/main" r:embed="rId5"/>
                 </a:ext>
               </a:extLst>
             </a:blip>
@@ -7782,7 +7782,7 @@
                   <a14:useLocalDpi xmlns:a14="http://schemas.microsoft.com/office/drawing/2010/main" val="0"/>
                 </a:ext>
                 <a:ext uri="{96DAC541-7B7A-43D3-8B79-37D633B846F1}">
-                  <asvg:svgBlip xmlns:asvg="http://schemas.microsoft.com/office/drawing/2016/SVG/main" xmlns="" r:embed="rId5"/>
+                  <asvg:svgBlip xmlns="" xmlns:asvg="http://schemas.microsoft.com/office/drawing/2016/SVG/main" r:embed="rId5"/>
                 </a:ext>
               </a:extLst>
             </a:blip>

</xml_diff>